<commit_message>
Update to images in power point
</commit_message>
<xml_diff>
--- a/RolandaAzeem_Ecommerce Recommendation System.pptx
+++ b/RolandaAzeem_Ecommerce Recommendation System.pptx
@@ -11363,59 +11363,6 @@
       </p:sp>
       <p:sp>
         <p:nvSpPr>
-          <p:cNvPr id="7" name="Freeform 7"/>
-          <p:cNvSpPr/>
-          <p:nvPr/>
-        </p:nvSpPr>
-        <p:spPr>
-          <a:xfrm>
-            <a:off x="5323388" y="3339825"/>
-            <a:ext cx="11935912" cy="4391294"/>
-          </a:xfrm>
-          <a:custGeom>
-            <a:avLst/>
-            <a:gdLst/>
-            <a:ahLst/>
-            <a:cxnLst/>
-            <a:rect l="l" t="t" r="r" b="b"/>
-            <a:pathLst>
-              <a:path w="11935912" h="4391294">
-                <a:moveTo>
-                  <a:pt x="0" y="0"/>
-                </a:moveTo>
-                <a:lnTo>
-                  <a:pt x="11935912" y="0"/>
-                </a:lnTo>
-                <a:lnTo>
-                  <a:pt x="11935912" y="4391295"/>
-                </a:lnTo>
-                <a:lnTo>
-                  <a:pt x="0" y="4391295"/>
-                </a:lnTo>
-                <a:lnTo>
-                  <a:pt x="0" y="0"/>
-                </a:lnTo>
-                <a:close/>
-              </a:path>
-            </a:pathLst>
-          </a:custGeom>
-          <a:blipFill>
-            <a:blip r:embed="rId6"/>
-            <a:stretch>
-              <a:fillRect/>
-            </a:stretch>
-          </a:blipFill>
-          <a:ln w="19050" cap="sq">
-            <a:solidFill>
-              <a:srgbClr val="EF6F9D"/>
-            </a:solidFill>
-            <a:prstDash val="solid"/>
-            <a:miter/>
-          </a:ln>
-        </p:spPr>
-      </p:sp>
-      <p:sp>
-        <p:nvSpPr>
           <p:cNvPr id="8" name="TextBox 8"/>
           <p:cNvSpPr txBox="1"/>
           <p:nvPr/>
@@ -11560,6 +11507,47 @@
           </a:p>
         </p:txBody>
       </p:sp>
+      <p:pic>
+        <p:nvPicPr>
+          <p:cNvPr id="12" name="Picture 11">
+            <a:extLst>
+              <a:ext uri="{FF2B5EF4-FFF2-40B4-BE49-F238E27FC236}">
+                <a16:creationId xmlns:a16="http://schemas.microsoft.com/office/drawing/2014/main" id="{49EE986B-FF5A-486F-85B2-E23BF10F9214}"/>
+              </a:ext>
+            </a:extLst>
+          </p:cNvPr>
+          <p:cNvPicPr>
+            <a:picLocks noChangeAspect="1"/>
+          </p:cNvPicPr>
+          <p:nvPr/>
+        </p:nvPicPr>
+        <p:blipFill>
+          <a:blip r:embed="rId6">
+            <a:extLst>
+              <a:ext uri="{28A0092B-C50C-407E-A947-70E740481C1C}">
+                <a14:useLocalDpi xmlns:a14="http://schemas.microsoft.com/office/drawing/2010/main" val="0"/>
+              </a:ext>
+            </a:extLst>
+          </a:blip>
+          <a:stretch>
+            <a:fillRect/>
+          </a:stretch>
+        </p:blipFill>
+        <p:spPr>
+          <a:xfrm>
+            <a:off x="5555721" y="3027913"/>
+            <a:ext cx="11703579" cy="4087910"/>
+          </a:xfrm>
+          <a:prstGeom prst="rect">
+            <a:avLst/>
+          </a:prstGeom>
+          <a:ln>
+            <a:solidFill>
+              <a:srgbClr val="FF0000"/>
+            </a:solidFill>
+          </a:ln>
+        </p:spPr>
+      </p:pic>
     </p:spTree>
   </p:cSld>
   <p:clrMapOvr>
@@ -11828,59 +11816,6 @@
       </p:sp>
       <p:sp>
         <p:nvSpPr>
-          <p:cNvPr id="7" name="Freeform 7"/>
-          <p:cNvSpPr/>
-          <p:nvPr/>
-        </p:nvSpPr>
-        <p:spPr>
-          <a:xfrm>
-            <a:off x="1890284" y="3452681"/>
-            <a:ext cx="14507433" cy="4700813"/>
-          </a:xfrm>
-          <a:custGeom>
-            <a:avLst/>
-            <a:gdLst/>
-            <a:ahLst/>
-            <a:cxnLst/>
-            <a:rect l="l" t="t" r="r" b="b"/>
-            <a:pathLst>
-              <a:path w="14507433" h="4700813">
-                <a:moveTo>
-                  <a:pt x="0" y="0"/>
-                </a:moveTo>
-                <a:lnTo>
-                  <a:pt x="14507432" y="0"/>
-                </a:lnTo>
-                <a:lnTo>
-                  <a:pt x="14507432" y="4700813"/>
-                </a:lnTo>
-                <a:lnTo>
-                  <a:pt x="0" y="4700813"/>
-                </a:lnTo>
-                <a:lnTo>
-                  <a:pt x="0" y="0"/>
-                </a:lnTo>
-                <a:close/>
-              </a:path>
-            </a:pathLst>
-          </a:custGeom>
-          <a:blipFill>
-            <a:blip r:embed="rId6"/>
-            <a:stretch>
-              <a:fillRect/>
-            </a:stretch>
-          </a:blipFill>
-          <a:ln w="19050" cap="sq">
-            <a:solidFill>
-              <a:srgbClr val="EF6F9D"/>
-            </a:solidFill>
-            <a:prstDash val="solid"/>
-            <a:miter/>
-          </a:ln>
-        </p:spPr>
-      </p:sp>
-      <p:sp>
-        <p:nvSpPr>
           <p:cNvPr id="8" name="TextBox 8"/>
           <p:cNvSpPr txBox="1"/>
           <p:nvPr/>
@@ -11961,6 +11896,47 @@
           </a:p>
         </p:txBody>
       </p:sp>
+      <p:pic>
+        <p:nvPicPr>
+          <p:cNvPr id="11" name="Picture 10">
+            <a:extLst>
+              <a:ext uri="{FF2B5EF4-FFF2-40B4-BE49-F238E27FC236}">
+                <a16:creationId xmlns:a16="http://schemas.microsoft.com/office/drawing/2014/main" id="{5AB034B2-C322-4B92-84B5-309872A63558}"/>
+              </a:ext>
+            </a:extLst>
+          </p:cNvPr>
+          <p:cNvPicPr>
+            <a:picLocks noChangeAspect="1"/>
+          </p:cNvPicPr>
+          <p:nvPr/>
+        </p:nvPicPr>
+        <p:blipFill>
+          <a:blip r:embed="rId6">
+            <a:extLst>
+              <a:ext uri="{28A0092B-C50C-407E-A947-70E740481C1C}">
+                <a14:useLocalDpi xmlns:a14="http://schemas.microsoft.com/office/drawing/2010/main" val="0"/>
+              </a:ext>
+            </a:extLst>
+          </a:blip>
+          <a:stretch>
+            <a:fillRect/>
+          </a:stretch>
+        </p:blipFill>
+        <p:spPr>
+          <a:xfrm>
+            <a:off x="762000" y="2759468"/>
+            <a:ext cx="16230600" cy="5478817"/>
+          </a:xfrm>
+          <a:prstGeom prst="rect">
+            <a:avLst/>
+          </a:prstGeom>
+          <a:ln>
+            <a:solidFill>
+              <a:srgbClr val="FF0000"/>
+            </a:solidFill>
+          </a:ln>
+        </p:spPr>
+      </p:pic>
     </p:spTree>
   </p:cSld>
   <p:clrMapOvr>
@@ -12229,59 +12205,6 @@
       </p:sp>
       <p:sp>
         <p:nvSpPr>
-          <p:cNvPr id="7" name="Freeform 7"/>
-          <p:cNvSpPr/>
-          <p:nvPr/>
-        </p:nvSpPr>
-        <p:spPr>
-          <a:xfrm>
-            <a:off x="3151662" y="2917623"/>
-            <a:ext cx="11984675" cy="5019518"/>
-          </a:xfrm>
-          <a:custGeom>
-            <a:avLst/>
-            <a:gdLst/>
-            <a:ahLst/>
-            <a:cxnLst/>
-            <a:rect l="l" t="t" r="r" b="b"/>
-            <a:pathLst>
-              <a:path w="11984675" h="5019518">
-                <a:moveTo>
-                  <a:pt x="0" y="0"/>
-                </a:moveTo>
-                <a:lnTo>
-                  <a:pt x="11984676" y="0"/>
-                </a:lnTo>
-                <a:lnTo>
-                  <a:pt x="11984676" y="5019519"/>
-                </a:lnTo>
-                <a:lnTo>
-                  <a:pt x="0" y="5019519"/>
-                </a:lnTo>
-                <a:lnTo>
-                  <a:pt x="0" y="0"/>
-                </a:lnTo>
-                <a:close/>
-              </a:path>
-            </a:pathLst>
-          </a:custGeom>
-          <a:blipFill>
-            <a:blip r:embed="rId6"/>
-            <a:stretch>
-              <a:fillRect/>
-            </a:stretch>
-          </a:blipFill>
-          <a:ln w="19050" cap="sq">
-            <a:solidFill>
-              <a:srgbClr val="EF6F9D"/>
-            </a:solidFill>
-            <a:prstDash val="solid"/>
-            <a:miter/>
-          </a:ln>
-        </p:spPr>
-      </p:sp>
-      <p:sp>
-        <p:nvSpPr>
           <p:cNvPr id="8" name="TextBox 8"/>
           <p:cNvSpPr txBox="1"/>
           <p:nvPr/>
@@ -12362,6 +12285,47 @@
           </a:p>
         </p:txBody>
       </p:sp>
+      <p:pic>
+        <p:nvPicPr>
+          <p:cNvPr id="11" name="Picture 10">
+            <a:extLst>
+              <a:ext uri="{FF2B5EF4-FFF2-40B4-BE49-F238E27FC236}">
+                <a16:creationId xmlns:a16="http://schemas.microsoft.com/office/drawing/2014/main" id="{885F3241-8D48-4F06-80B4-9D8DEFFF0F79}"/>
+              </a:ext>
+            </a:extLst>
+          </p:cNvPr>
+          <p:cNvPicPr>
+            <a:picLocks noChangeAspect="1"/>
+          </p:cNvPicPr>
+          <p:nvPr/>
+        </p:nvPicPr>
+        <p:blipFill>
+          <a:blip r:embed="rId6">
+            <a:extLst>
+              <a:ext uri="{28A0092B-C50C-407E-A947-70E740481C1C}">
+                <a14:useLocalDpi xmlns:a14="http://schemas.microsoft.com/office/drawing/2010/main" val="0"/>
+              </a:ext>
+            </a:extLst>
+          </a:blip>
+          <a:stretch>
+            <a:fillRect/>
+          </a:stretch>
+        </p:blipFill>
+        <p:spPr>
+          <a:xfrm>
+            <a:off x="1828800" y="2421306"/>
+            <a:ext cx="14003346" cy="5816979"/>
+          </a:xfrm>
+          <a:prstGeom prst="rect">
+            <a:avLst/>
+          </a:prstGeom>
+          <a:ln>
+            <a:solidFill>
+              <a:srgbClr val="FF0000"/>
+            </a:solidFill>
+          </a:ln>
+        </p:spPr>
+      </p:pic>
     </p:spTree>
   </p:cSld>
   <p:clrMapOvr>

</xml_diff>